<commit_message>
feat: Implement PowerPoint template and slide duplication logic
</commit_message>
<xml_diff>
--- a/output_images.pptx
+++ b/output_images.pptx
@@ -15,6 +15,8 @@
     <p:sldId id="263" r:id="rId14"/>
     <p:sldId id="264" r:id="rId15"/>
     <p:sldId id="265" r:id="rId16"/>
+    <p:sldId id="266" r:id="rId17"/>
+    <p:sldId id="267" r:id="rId18"/>
   </p:sldIdLst>
   <p:sldSz cx="9144000" cy="6858000" type="screen4x3"/>
   <p:notesSz cx="6858000" cy="9144000"/>
@@ -3097,133 +3099,6 @@
         <p:nvPr/>
       </p:nvGrpSpPr>
       <p:grpSpPr/>
-      <p:sp>
-        <p:nvSpPr>
-          <p:cNvPr id="2" name="TextBox 1"/>
-          <p:cNvSpPr txBox="1"/>
-          <p:nvPr/>
-        </p:nvSpPr>
-        <p:spPr>
-          <a:xfrm>
-            <a:off x="7315200" y="91440"/>
-            <a:ext cx="1737360" cy="457200"/>
-          </a:xfrm>
-          <a:prstGeom prst="rect">
-            <a:avLst/>
-          </a:prstGeom>
-          <a:noFill/>
-        </p:spPr>
-        <p:txBody>
-          <a:bodyPr wrap="square">
-            <a:spAutoFit/>
-          </a:bodyPr>
-          <a:lstStyle/>
-          <a:p>
-            <a:pPr>
-              <a:defRPr sz="1000"/>
-            </a:pPr>
-            <a:r>
-              <a:t>sample_image_01.jpeg</a:t>
-            </a:r>
-          </a:p>
-        </p:txBody>
-      </p:sp>
-      <p:pic>
-        <p:nvPicPr>
-          <p:cNvPr id="3" name="Picture 2" descr="temp_cropped_pptx_image_sample_image_01.jpeg_B2.png"/>
-          <p:cNvPicPr>
-            <a:picLocks noChangeAspect="1"/>
-          </p:cNvPicPr>
-          <p:nvPr/>
-        </p:nvPicPr>
-        <p:blipFill>
-          <a:blip r:embed="rId2"/>
-          <a:stretch>
-            <a:fillRect/>
-          </a:stretch>
-        </p:blipFill>
-        <p:spPr>
-          <a:xfrm>
-            <a:off x="609600" y="190500"/>
-            <a:ext cx="1968500" cy="698500"/>
-          </a:xfrm>
-          <a:prstGeom prst="rect">
-            <a:avLst/>
-          </a:prstGeom>
-        </p:spPr>
-      </p:pic>
-      <p:pic>
-        <p:nvPicPr>
-          <p:cNvPr id="4" name="Picture 3" descr="temp_cropped_pptx_image_sample_image_01.jpeg_B8.png"/>
-          <p:cNvPicPr>
-            <a:picLocks noChangeAspect="1"/>
-          </p:cNvPicPr>
-          <p:nvPr/>
-        </p:nvPicPr>
-        <p:blipFill>
-          <a:blip r:embed="rId3"/>
-          <a:stretch>
-            <a:fillRect/>
-          </a:stretch>
-        </p:blipFill>
-        <p:spPr>
-          <a:xfrm>
-            <a:off x="609600" y="1333500"/>
-            <a:ext cx="2603500" cy="698500"/>
-          </a:xfrm>
-          <a:prstGeom prst="rect">
-            <a:avLst/>
-          </a:prstGeom>
-        </p:spPr>
-      </p:pic>
-      <p:pic>
-        <p:nvPicPr>
-          <p:cNvPr id="5" name="Picture 4" descr="temp_cropped_pptx_image_sample_image_01.jpeg_B14.png"/>
-          <p:cNvPicPr>
-            <a:picLocks noChangeAspect="1"/>
-          </p:cNvPicPr>
-          <p:nvPr/>
-        </p:nvPicPr>
-        <p:blipFill>
-          <a:blip r:embed="rId4"/>
-          <a:stretch>
-            <a:fillRect/>
-          </a:stretch>
-        </p:blipFill>
-        <p:spPr>
-          <a:xfrm>
-            <a:off x="609600" y="2476500"/>
-            <a:ext cx="3238500" cy="698500"/>
-          </a:xfrm>
-          <a:prstGeom prst="rect">
-            <a:avLst/>
-          </a:prstGeom>
-        </p:spPr>
-      </p:pic>
-      <p:pic>
-        <p:nvPicPr>
-          <p:cNvPr id="6" name="Picture 5" descr="temp_cropped_pptx_image_sample_image_01.jpeg_B20.png"/>
-          <p:cNvPicPr>
-            <a:picLocks noChangeAspect="1"/>
-          </p:cNvPicPr>
-          <p:nvPr/>
-        </p:nvPicPr>
-        <p:blipFill>
-          <a:blip r:embed="rId5"/>
-          <a:stretch>
-            <a:fillRect/>
-          </a:stretch>
-        </p:blipFill>
-        <p:spPr>
-          <a:xfrm>
-            <a:off x="609600" y="3619500"/>
-            <a:ext cx="2603500" cy="698500"/>
-          </a:xfrm>
-          <a:prstGeom prst="rect">
-            <a:avLst/>
-          </a:prstGeom>
-        </p:spPr>
-      </p:pic>
     </p:spTree>
   </p:cSld>
   <p:clrMapOvr>
@@ -3268,14 +3143,14 @@
               <a:defRPr sz="1000"/>
             </a:pPr>
             <a:r>
-              <a:t>sample_image_10.jpeg</a:t>
+              <a:t>sample_image_08.jpeg</a:t>
             </a:r>
           </a:p>
         </p:txBody>
       </p:sp>
       <p:pic>
         <p:nvPicPr>
-          <p:cNvPr id="3" name="Picture 2" descr="temp_cropped_pptx_image_sample_image_10.jpeg_B2.png"/>
+          <p:cNvPr id="3" name="Picture 2" descr="tmpsq30y_cj.png"/>
           <p:cNvPicPr>
             <a:picLocks noChangeAspect="1"/>
           </p:cNvPicPr>
@@ -3299,7 +3174,7 @@
       </p:pic>
       <p:pic>
         <p:nvPicPr>
-          <p:cNvPr id="4" name="Picture 3" descr="temp_cropped_pptx_image_sample_image_10.jpeg_B8.png"/>
+          <p:cNvPr id="4" name="Picture 3" descr="tmpq99ggyxk.png"/>
           <p:cNvPicPr>
             <a:picLocks noChangeAspect="1"/>
           </p:cNvPicPr>
@@ -3323,7 +3198,7 @@
       </p:pic>
       <p:pic>
         <p:nvPicPr>
-          <p:cNvPr id="5" name="Picture 4" descr="temp_cropped_pptx_image_sample_image_10.jpeg_B14.png"/>
+          <p:cNvPr id="5" name="Picture 4" descr="tmp2z8jhr5d.png"/>
           <p:cNvPicPr>
             <a:picLocks noChangeAspect="1"/>
           </p:cNvPicPr>
@@ -3347,7 +3222,297 @@
       </p:pic>
       <p:pic>
         <p:nvPicPr>
-          <p:cNvPr id="6" name="Picture 5" descr="temp_cropped_pptx_image_sample_image_10.jpeg_B20.png"/>
+          <p:cNvPr id="6" name="Picture 5" descr="tmppv8g9aie.png"/>
+          <p:cNvPicPr>
+            <a:picLocks noChangeAspect="1"/>
+          </p:cNvPicPr>
+          <p:nvPr/>
+        </p:nvPicPr>
+        <p:blipFill>
+          <a:blip r:embed="rId5"/>
+          <a:stretch>
+            <a:fillRect/>
+          </a:stretch>
+        </p:blipFill>
+        <p:spPr>
+          <a:xfrm>
+            <a:off x="609600" y="3619500"/>
+            <a:ext cx="2603500" cy="698500"/>
+          </a:xfrm>
+          <a:prstGeom prst="rect">
+            <a:avLst/>
+          </a:prstGeom>
+        </p:spPr>
+      </p:pic>
+    </p:spTree>
+  </p:cSld>
+  <p:clrMapOvr>
+    <a:masterClrMapping/>
+  </p:clrMapOvr>
+</p:sld>
+</file>
+
+<file path=ppt/slides/slide11.xml><?xml version="1.0" encoding="utf-8"?>
+<p:sld xmlns:a="http://schemas.openxmlformats.org/drawingml/2006/main" xmlns:p="http://schemas.openxmlformats.org/presentationml/2006/main" xmlns:r="http://schemas.openxmlformats.org/officeDocument/2006/relationships">
+  <p:cSld>
+    <p:spTree>
+      <p:nvGrpSpPr>
+        <p:cNvPr id="1" name=""/>
+        <p:cNvGrpSpPr/>
+        <p:nvPr/>
+      </p:nvGrpSpPr>
+      <p:grpSpPr/>
+      <p:sp>
+        <p:nvSpPr>
+          <p:cNvPr id="2" name="TextBox 1"/>
+          <p:cNvSpPr txBox="1"/>
+          <p:nvPr/>
+        </p:nvSpPr>
+        <p:spPr>
+          <a:xfrm>
+            <a:off x="7315200" y="91440"/>
+            <a:ext cx="1737360" cy="457200"/>
+          </a:xfrm>
+          <a:prstGeom prst="rect">
+            <a:avLst/>
+          </a:prstGeom>
+          <a:noFill/>
+        </p:spPr>
+        <p:txBody>
+          <a:bodyPr wrap="square">
+            <a:spAutoFit/>
+          </a:bodyPr>
+          <a:lstStyle/>
+          <a:p>
+            <a:pPr>
+              <a:defRPr sz="1000"/>
+            </a:pPr>
+            <a:r>
+              <a:t>sample_image_09.jpeg</a:t>
+            </a:r>
+          </a:p>
+        </p:txBody>
+      </p:sp>
+      <p:pic>
+        <p:nvPicPr>
+          <p:cNvPr id="3" name="Picture 2" descr="tmpo0wte7v8.png"/>
+          <p:cNvPicPr>
+            <a:picLocks noChangeAspect="1"/>
+          </p:cNvPicPr>
+          <p:nvPr/>
+        </p:nvPicPr>
+        <p:blipFill>
+          <a:blip r:embed="rId2"/>
+          <a:stretch>
+            <a:fillRect/>
+          </a:stretch>
+        </p:blipFill>
+        <p:spPr>
+          <a:xfrm>
+            <a:off x="609600" y="190500"/>
+            <a:ext cx="1968500" cy="698500"/>
+          </a:xfrm>
+          <a:prstGeom prst="rect">
+            <a:avLst/>
+          </a:prstGeom>
+        </p:spPr>
+      </p:pic>
+      <p:pic>
+        <p:nvPicPr>
+          <p:cNvPr id="4" name="Picture 3" descr="tmpfwxy203u.png"/>
+          <p:cNvPicPr>
+            <a:picLocks noChangeAspect="1"/>
+          </p:cNvPicPr>
+          <p:nvPr/>
+        </p:nvPicPr>
+        <p:blipFill>
+          <a:blip r:embed="rId3"/>
+          <a:stretch>
+            <a:fillRect/>
+          </a:stretch>
+        </p:blipFill>
+        <p:spPr>
+          <a:xfrm>
+            <a:off x="609600" y="1333500"/>
+            <a:ext cx="2603500" cy="698500"/>
+          </a:xfrm>
+          <a:prstGeom prst="rect">
+            <a:avLst/>
+          </a:prstGeom>
+        </p:spPr>
+      </p:pic>
+      <p:pic>
+        <p:nvPicPr>
+          <p:cNvPr id="5" name="Picture 4" descr="tmp4wbvhxwp.png"/>
+          <p:cNvPicPr>
+            <a:picLocks noChangeAspect="1"/>
+          </p:cNvPicPr>
+          <p:nvPr/>
+        </p:nvPicPr>
+        <p:blipFill>
+          <a:blip r:embed="rId4"/>
+          <a:stretch>
+            <a:fillRect/>
+          </a:stretch>
+        </p:blipFill>
+        <p:spPr>
+          <a:xfrm>
+            <a:off x="609600" y="2476500"/>
+            <a:ext cx="3238500" cy="698500"/>
+          </a:xfrm>
+          <a:prstGeom prst="rect">
+            <a:avLst/>
+          </a:prstGeom>
+        </p:spPr>
+      </p:pic>
+      <p:pic>
+        <p:nvPicPr>
+          <p:cNvPr id="6" name="Picture 5" descr="tmppmeo4m0_.png"/>
+          <p:cNvPicPr>
+            <a:picLocks noChangeAspect="1"/>
+          </p:cNvPicPr>
+          <p:nvPr/>
+        </p:nvPicPr>
+        <p:blipFill>
+          <a:blip r:embed="rId5"/>
+          <a:stretch>
+            <a:fillRect/>
+          </a:stretch>
+        </p:blipFill>
+        <p:spPr>
+          <a:xfrm>
+            <a:off x="609600" y="3619500"/>
+            <a:ext cx="2603500" cy="698500"/>
+          </a:xfrm>
+          <a:prstGeom prst="rect">
+            <a:avLst/>
+          </a:prstGeom>
+        </p:spPr>
+      </p:pic>
+    </p:spTree>
+  </p:cSld>
+  <p:clrMapOvr>
+    <a:masterClrMapping/>
+  </p:clrMapOvr>
+</p:sld>
+</file>
+
+<file path=ppt/slides/slide12.xml><?xml version="1.0" encoding="utf-8"?>
+<p:sld xmlns:a="http://schemas.openxmlformats.org/drawingml/2006/main" xmlns:p="http://schemas.openxmlformats.org/presentationml/2006/main" xmlns:r="http://schemas.openxmlformats.org/officeDocument/2006/relationships">
+  <p:cSld>
+    <p:spTree>
+      <p:nvGrpSpPr>
+        <p:cNvPr id="1" name=""/>
+        <p:cNvGrpSpPr/>
+        <p:nvPr/>
+      </p:nvGrpSpPr>
+      <p:grpSpPr/>
+      <p:sp>
+        <p:nvSpPr>
+          <p:cNvPr id="2" name="TextBox 1"/>
+          <p:cNvSpPr txBox="1"/>
+          <p:nvPr/>
+        </p:nvSpPr>
+        <p:spPr>
+          <a:xfrm>
+            <a:off x="7315200" y="91440"/>
+            <a:ext cx="1737360" cy="457200"/>
+          </a:xfrm>
+          <a:prstGeom prst="rect">
+            <a:avLst/>
+          </a:prstGeom>
+          <a:noFill/>
+        </p:spPr>
+        <p:txBody>
+          <a:bodyPr wrap="square">
+            <a:spAutoFit/>
+          </a:bodyPr>
+          <a:lstStyle/>
+          <a:p>
+            <a:pPr>
+              <a:defRPr sz="1000"/>
+            </a:pPr>
+            <a:r>
+              <a:t>sample_image_10.jpeg</a:t>
+            </a:r>
+          </a:p>
+        </p:txBody>
+      </p:sp>
+      <p:pic>
+        <p:nvPicPr>
+          <p:cNvPr id="3" name="Picture 2" descr="tmpjav419d9.png"/>
+          <p:cNvPicPr>
+            <a:picLocks noChangeAspect="1"/>
+          </p:cNvPicPr>
+          <p:nvPr/>
+        </p:nvPicPr>
+        <p:blipFill>
+          <a:blip r:embed="rId2"/>
+          <a:stretch>
+            <a:fillRect/>
+          </a:stretch>
+        </p:blipFill>
+        <p:spPr>
+          <a:xfrm>
+            <a:off x="609600" y="190500"/>
+            <a:ext cx="1968500" cy="698500"/>
+          </a:xfrm>
+          <a:prstGeom prst="rect">
+            <a:avLst/>
+          </a:prstGeom>
+        </p:spPr>
+      </p:pic>
+      <p:pic>
+        <p:nvPicPr>
+          <p:cNvPr id="4" name="Picture 3" descr="tmpnk3o4gmh.png"/>
+          <p:cNvPicPr>
+            <a:picLocks noChangeAspect="1"/>
+          </p:cNvPicPr>
+          <p:nvPr/>
+        </p:nvPicPr>
+        <p:blipFill>
+          <a:blip r:embed="rId3"/>
+          <a:stretch>
+            <a:fillRect/>
+          </a:stretch>
+        </p:blipFill>
+        <p:spPr>
+          <a:xfrm>
+            <a:off x="609600" y="1333500"/>
+            <a:ext cx="2603500" cy="698500"/>
+          </a:xfrm>
+          <a:prstGeom prst="rect">
+            <a:avLst/>
+          </a:prstGeom>
+        </p:spPr>
+      </p:pic>
+      <p:pic>
+        <p:nvPicPr>
+          <p:cNvPr id="5" name="Picture 4" descr="tmpku74kuta.png"/>
+          <p:cNvPicPr>
+            <a:picLocks noChangeAspect="1"/>
+          </p:cNvPicPr>
+          <p:nvPr/>
+        </p:nvPicPr>
+        <p:blipFill>
+          <a:blip r:embed="rId4"/>
+          <a:stretch>
+            <a:fillRect/>
+          </a:stretch>
+        </p:blipFill>
+        <p:spPr>
+          <a:xfrm>
+            <a:off x="609600" y="2476500"/>
+            <a:ext cx="3238500" cy="698500"/>
+          </a:xfrm>
+          <a:prstGeom prst="rect">
+            <a:avLst/>
+          </a:prstGeom>
+        </p:spPr>
+      </p:pic>
+      <p:pic>
+        <p:nvPicPr>
+          <p:cNvPr id="6" name="Picture 5" descr="tmpxpfn37dk.png"/>
           <p:cNvPicPr>
             <a:picLocks noChangeAspect="1"/>
           </p:cNvPicPr>
@@ -3387,133 +3552,6 @@
         <p:nvPr/>
       </p:nvGrpSpPr>
       <p:grpSpPr/>
-      <p:sp>
-        <p:nvSpPr>
-          <p:cNvPr id="2" name="TextBox 1"/>
-          <p:cNvSpPr txBox="1"/>
-          <p:nvPr/>
-        </p:nvSpPr>
-        <p:spPr>
-          <a:xfrm>
-            <a:off x="7315200" y="91440"/>
-            <a:ext cx="1737360" cy="457200"/>
-          </a:xfrm>
-          <a:prstGeom prst="rect">
-            <a:avLst/>
-          </a:prstGeom>
-          <a:noFill/>
-        </p:spPr>
-        <p:txBody>
-          <a:bodyPr wrap="square">
-            <a:spAutoFit/>
-          </a:bodyPr>
-          <a:lstStyle/>
-          <a:p>
-            <a:pPr>
-              <a:defRPr sz="1000"/>
-            </a:pPr>
-            <a:r>
-              <a:t>sample_image_02.jpeg</a:t>
-            </a:r>
-          </a:p>
-        </p:txBody>
-      </p:sp>
-      <p:pic>
-        <p:nvPicPr>
-          <p:cNvPr id="3" name="Picture 2" descr="temp_cropped_pptx_image_sample_image_02.jpeg_B2.png"/>
-          <p:cNvPicPr>
-            <a:picLocks noChangeAspect="1"/>
-          </p:cNvPicPr>
-          <p:nvPr/>
-        </p:nvPicPr>
-        <p:blipFill>
-          <a:blip r:embed="rId2"/>
-          <a:stretch>
-            <a:fillRect/>
-          </a:stretch>
-        </p:blipFill>
-        <p:spPr>
-          <a:xfrm>
-            <a:off x="609600" y="190500"/>
-            <a:ext cx="1968500" cy="698500"/>
-          </a:xfrm>
-          <a:prstGeom prst="rect">
-            <a:avLst/>
-          </a:prstGeom>
-        </p:spPr>
-      </p:pic>
-      <p:pic>
-        <p:nvPicPr>
-          <p:cNvPr id="4" name="Picture 3" descr="temp_cropped_pptx_image_sample_image_02.jpeg_B8.png"/>
-          <p:cNvPicPr>
-            <a:picLocks noChangeAspect="1"/>
-          </p:cNvPicPr>
-          <p:nvPr/>
-        </p:nvPicPr>
-        <p:blipFill>
-          <a:blip r:embed="rId3"/>
-          <a:stretch>
-            <a:fillRect/>
-          </a:stretch>
-        </p:blipFill>
-        <p:spPr>
-          <a:xfrm>
-            <a:off x="609600" y="1333500"/>
-            <a:ext cx="2603500" cy="698500"/>
-          </a:xfrm>
-          <a:prstGeom prst="rect">
-            <a:avLst/>
-          </a:prstGeom>
-        </p:spPr>
-      </p:pic>
-      <p:pic>
-        <p:nvPicPr>
-          <p:cNvPr id="5" name="Picture 4" descr="temp_cropped_pptx_image_sample_image_02.jpeg_B14.png"/>
-          <p:cNvPicPr>
-            <a:picLocks noChangeAspect="1"/>
-          </p:cNvPicPr>
-          <p:nvPr/>
-        </p:nvPicPr>
-        <p:blipFill>
-          <a:blip r:embed="rId4"/>
-          <a:stretch>
-            <a:fillRect/>
-          </a:stretch>
-        </p:blipFill>
-        <p:spPr>
-          <a:xfrm>
-            <a:off x="609600" y="2476500"/>
-            <a:ext cx="3238500" cy="698500"/>
-          </a:xfrm>
-          <a:prstGeom prst="rect">
-            <a:avLst/>
-          </a:prstGeom>
-        </p:spPr>
-      </p:pic>
-      <p:pic>
-        <p:nvPicPr>
-          <p:cNvPr id="6" name="Picture 5" descr="temp_cropped_pptx_image_sample_image_02.jpeg_B20.png"/>
-          <p:cNvPicPr>
-            <a:picLocks noChangeAspect="1"/>
-          </p:cNvPicPr>
-          <p:nvPr/>
-        </p:nvPicPr>
-        <p:blipFill>
-          <a:blip r:embed="rId5"/>
-          <a:stretch>
-            <a:fillRect/>
-          </a:stretch>
-        </p:blipFill>
-        <p:spPr>
-          <a:xfrm>
-            <a:off x="609600" y="3619500"/>
-            <a:ext cx="2603500" cy="698500"/>
-          </a:xfrm>
-          <a:prstGeom prst="rect">
-            <a:avLst/>
-          </a:prstGeom>
-        </p:spPr>
-      </p:pic>
     </p:spTree>
   </p:cSld>
   <p:clrMapOvr>
@@ -3558,14 +3596,14 @@
               <a:defRPr sz="1000"/>
             </a:pPr>
             <a:r>
-              <a:t>sample_image_03.jpeg</a:t>
+              <a:t>sample_image_01.jpeg</a:t>
             </a:r>
           </a:p>
         </p:txBody>
       </p:sp>
       <p:pic>
         <p:nvPicPr>
-          <p:cNvPr id="3" name="Picture 2" descr="temp_cropped_pptx_image_sample_image_03.jpeg_B2.png"/>
+          <p:cNvPr id="3" name="Picture 2" descr="tmpz7qawo4c.png"/>
           <p:cNvPicPr>
             <a:picLocks noChangeAspect="1"/>
           </p:cNvPicPr>
@@ -3589,7 +3627,7 @@
       </p:pic>
       <p:pic>
         <p:nvPicPr>
-          <p:cNvPr id="4" name="Picture 3" descr="temp_cropped_pptx_image_sample_image_03.jpeg_B8.png"/>
+          <p:cNvPr id="4" name="Picture 3" descr="tmpwb89m5iq.png"/>
           <p:cNvPicPr>
             <a:picLocks noChangeAspect="1"/>
           </p:cNvPicPr>
@@ -3613,7 +3651,7 @@
       </p:pic>
       <p:pic>
         <p:nvPicPr>
-          <p:cNvPr id="5" name="Picture 4" descr="temp_cropped_pptx_image_sample_image_03.jpeg_B14.png"/>
+          <p:cNvPr id="5" name="Picture 4" descr="tmpvymg3nw8.png"/>
           <p:cNvPicPr>
             <a:picLocks noChangeAspect="1"/>
           </p:cNvPicPr>
@@ -3637,7 +3675,7 @@
       </p:pic>
       <p:pic>
         <p:nvPicPr>
-          <p:cNvPr id="6" name="Picture 5" descr="temp_cropped_pptx_image_sample_image_03.jpeg_B20.png"/>
+          <p:cNvPr id="6" name="Picture 5" descr="tmptzlgphh2.png"/>
           <p:cNvPicPr>
             <a:picLocks noChangeAspect="1"/>
           </p:cNvPicPr>
@@ -3703,14 +3741,14 @@
               <a:defRPr sz="1000"/>
             </a:pPr>
             <a:r>
-              <a:t>sample_image_04.jpeg</a:t>
+              <a:t>sample_image_02.jpeg</a:t>
             </a:r>
           </a:p>
         </p:txBody>
       </p:sp>
       <p:pic>
         <p:nvPicPr>
-          <p:cNvPr id="3" name="Picture 2" descr="temp_cropped_pptx_image_sample_image_04.jpeg_B2.png"/>
+          <p:cNvPr id="3" name="Picture 2" descr="tmpdqx3zl0a.png"/>
           <p:cNvPicPr>
             <a:picLocks noChangeAspect="1"/>
           </p:cNvPicPr>
@@ -3734,7 +3772,7 @@
       </p:pic>
       <p:pic>
         <p:nvPicPr>
-          <p:cNvPr id="4" name="Picture 3" descr="temp_cropped_pptx_image_sample_image_04.jpeg_B8.png"/>
+          <p:cNvPr id="4" name="Picture 3" descr="tmpq18pnc_2.png"/>
           <p:cNvPicPr>
             <a:picLocks noChangeAspect="1"/>
           </p:cNvPicPr>
@@ -3758,7 +3796,7 @@
       </p:pic>
       <p:pic>
         <p:nvPicPr>
-          <p:cNvPr id="5" name="Picture 4" descr="temp_cropped_pptx_image_sample_image_04.jpeg_B14.png"/>
+          <p:cNvPr id="5" name="Picture 4" descr="tmp0an413fe.png"/>
           <p:cNvPicPr>
             <a:picLocks noChangeAspect="1"/>
           </p:cNvPicPr>
@@ -3782,7 +3820,7 @@
       </p:pic>
       <p:pic>
         <p:nvPicPr>
-          <p:cNvPr id="6" name="Picture 5" descr="temp_cropped_pptx_image_sample_image_04.jpeg_B20.png"/>
+          <p:cNvPr id="6" name="Picture 5" descr="tmp79f76vgb.png"/>
           <p:cNvPicPr>
             <a:picLocks noChangeAspect="1"/>
           </p:cNvPicPr>
@@ -3848,14 +3886,14 @@
               <a:defRPr sz="1000"/>
             </a:pPr>
             <a:r>
-              <a:t>sample_image_05.jpeg</a:t>
+              <a:t>sample_image_03.jpeg</a:t>
             </a:r>
           </a:p>
         </p:txBody>
       </p:sp>
       <p:pic>
         <p:nvPicPr>
-          <p:cNvPr id="3" name="Picture 2" descr="temp_cropped_pptx_image_sample_image_05.jpeg_B2.png"/>
+          <p:cNvPr id="3" name="Picture 2" descr="tmpjvelttvd.png"/>
           <p:cNvPicPr>
             <a:picLocks noChangeAspect="1"/>
           </p:cNvPicPr>
@@ -3879,7 +3917,7 @@
       </p:pic>
       <p:pic>
         <p:nvPicPr>
-          <p:cNvPr id="4" name="Picture 3" descr="temp_cropped_pptx_image_sample_image_05.jpeg_B8.png"/>
+          <p:cNvPr id="4" name="Picture 3" descr="tmpu8mnjok9.png"/>
           <p:cNvPicPr>
             <a:picLocks noChangeAspect="1"/>
           </p:cNvPicPr>
@@ -3903,7 +3941,7 @@
       </p:pic>
       <p:pic>
         <p:nvPicPr>
-          <p:cNvPr id="5" name="Picture 4" descr="temp_cropped_pptx_image_sample_image_05.jpeg_B14.png"/>
+          <p:cNvPr id="5" name="Picture 4" descr="tmp3uvnn_yv.png"/>
           <p:cNvPicPr>
             <a:picLocks noChangeAspect="1"/>
           </p:cNvPicPr>
@@ -3927,7 +3965,7 @@
       </p:pic>
       <p:pic>
         <p:nvPicPr>
-          <p:cNvPr id="6" name="Picture 5" descr="temp_cropped_pptx_image_sample_image_05.jpeg_B20.png"/>
+          <p:cNvPr id="6" name="Picture 5" descr="tmpyrl1geyr.png"/>
           <p:cNvPicPr>
             <a:picLocks noChangeAspect="1"/>
           </p:cNvPicPr>
@@ -3993,14 +4031,14 @@
               <a:defRPr sz="1000"/>
             </a:pPr>
             <a:r>
-              <a:t>sample_image_06.jpeg</a:t>
+              <a:t>sample_image_04.jpeg</a:t>
             </a:r>
           </a:p>
         </p:txBody>
       </p:sp>
       <p:pic>
         <p:nvPicPr>
-          <p:cNvPr id="3" name="Picture 2" descr="temp_cropped_pptx_image_sample_image_06.jpeg_B2.png"/>
+          <p:cNvPr id="3" name="Picture 2" descr="tmp229ygck_.png"/>
           <p:cNvPicPr>
             <a:picLocks noChangeAspect="1"/>
           </p:cNvPicPr>
@@ -4024,7 +4062,7 @@
       </p:pic>
       <p:pic>
         <p:nvPicPr>
-          <p:cNvPr id="4" name="Picture 3" descr="temp_cropped_pptx_image_sample_image_06.jpeg_B8.png"/>
+          <p:cNvPr id="4" name="Picture 3" descr="tmp5u32cay8.png"/>
           <p:cNvPicPr>
             <a:picLocks noChangeAspect="1"/>
           </p:cNvPicPr>
@@ -4048,7 +4086,7 @@
       </p:pic>
       <p:pic>
         <p:nvPicPr>
-          <p:cNvPr id="5" name="Picture 4" descr="temp_cropped_pptx_image_sample_image_06.jpeg_B14.png"/>
+          <p:cNvPr id="5" name="Picture 4" descr="tmpbliuao7w.png"/>
           <p:cNvPicPr>
             <a:picLocks noChangeAspect="1"/>
           </p:cNvPicPr>
@@ -4072,7 +4110,7 @@
       </p:pic>
       <p:pic>
         <p:nvPicPr>
-          <p:cNvPr id="6" name="Picture 5" descr="temp_cropped_pptx_image_sample_image_06.jpeg_B20.png"/>
+          <p:cNvPr id="6" name="Picture 5" descr="tmpi2caycy_.png"/>
           <p:cNvPicPr>
             <a:picLocks noChangeAspect="1"/>
           </p:cNvPicPr>
@@ -4138,14 +4176,14 @@
               <a:defRPr sz="1000"/>
             </a:pPr>
             <a:r>
-              <a:t>sample_image_07.jpeg</a:t>
+              <a:t>sample_image_05.jpeg</a:t>
             </a:r>
           </a:p>
         </p:txBody>
       </p:sp>
       <p:pic>
         <p:nvPicPr>
-          <p:cNvPr id="3" name="Picture 2" descr="temp_cropped_pptx_image_sample_image_07.jpeg_B2.png"/>
+          <p:cNvPr id="3" name="Picture 2" descr="tmp_abigt05.png"/>
           <p:cNvPicPr>
             <a:picLocks noChangeAspect="1"/>
           </p:cNvPicPr>
@@ -4169,7 +4207,7 @@
       </p:pic>
       <p:pic>
         <p:nvPicPr>
-          <p:cNvPr id="4" name="Picture 3" descr="temp_cropped_pptx_image_sample_image_07.jpeg_B8.png"/>
+          <p:cNvPr id="4" name="Picture 3" descr="tmp5lnqdqow.png"/>
           <p:cNvPicPr>
             <a:picLocks noChangeAspect="1"/>
           </p:cNvPicPr>
@@ -4193,7 +4231,7 @@
       </p:pic>
       <p:pic>
         <p:nvPicPr>
-          <p:cNvPr id="5" name="Picture 4" descr="temp_cropped_pptx_image_sample_image_07.jpeg_B14.png"/>
+          <p:cNvPr id="5" name="Picture 4" descr="tmpw1yrzwtw.png"/>
           <p:cNvPicPr>
             <a:picLocks noChangeAspect="1"/>
           </p:cNvPicPr>
@@ -4217,7 +4255,7 @@
       </p:pic>
       <p:pic>
         <p:nvPicPr>
-          <p:cNvPr id="6" name="Picture 5" descr="temp_cropped_pptx_image_sample_image_07.jpeg_B20.png"/>
+          <p:cNvPr id="6" name="Picture 5" descr="tmpo_qkj1r0.png"/>
           <p:cNvPicPr>
             <a:picLocks noChangeAspect="1"/>
           </p:cNvPicPr>
@@ -4283,14 +4321,14 @@
               <a:defRPr sz="1000"/>
             </a:pPr>
             <a:r>
-              <a:t>sample_image_08.jpeg</a:t>
+              <a:t>sample_image_06.jpeg</a:t>
             </a:r>
           </a:p>
         </p:txBody>
       </p:sp>
       <p:pic>
         <p:nvPicPr>
-          <p:cNvPr id="3" name="Picture 2" descr="temp_cropped_pptx_image_sample_image_08.jpeg_B2.png"/>
+          <p:cNvPr id="3" name="Picture 2" descr="tmpfd040epp.png"/>
           <p:cNvPicPr>
             <a:picLocks noChangeAspect="1"/>
           </p:cNvPicPr>
@@ -4314,7 +4352,7 @@
       </p:pic>
       <p:pic>
         <p:nvPicPr>
-          <p:cNvPr id="4" name="Picture 3" descr="temp_cropped_pptx_image_sample_image_08.jpeg_B8.png"/>
+          <p:cNvPr id="4" name="Picture 3" descr="tmpzxa_kkzb.png"/>
           <p:cNvPicPr>
             <a:picLocks noChangeAspect="1"/>
           </p:cNvPicPr>
@@ -4338,7 +4376,7 @@
       </p:pic>
       <p:pic>
         <p:nvPicPr>
-          <p:cNvPr id="5" name="Picture 4" descr="temp_cropped_pptx_image_sample_image_08.jpeg_B14.png"/>
+          <p:cNvPr id="5" name="Picture 4" descr="tmp7yhfo_dd.png"/>
           <p:cNvPicPr>
             <a:picLocks noChangeAspect="1"/>
           </p:cNvPicPr>
@@ -4362,7 +4400,7 @@
       </p:pic>
       <p:pic>
         <p:nvPicPr>
-          <p:cNvPr id="6" name="Picture 5" descr="temp_cropped_pptx_image_sample_image_08.jpeg_B20.png"/>
+          <p:cNvPr id="6" name="Picture 5" descr="tmppk7tvzj2.png"/>
           <p:cNvPicPr>
             <a:picLocks noChangeAspect="1"/>
           </p:cNvPicPr>
@@ -4428,14 +4466,14 @@
               <a:defRPr sz="1000"/>
             </a:pPr>
             <a:r>
-              <a:t>sample_image_09.jpeg</a:t>
+              <a:t>sample_image_07.jpeg</a:t>
             </a:r>
           </a:p>
         </p:txBody>
       </p:sp>
       <p:pic>
         <p:nvPicPr>
-          <p:cNvPr id="3" name="Picture 2" descr="temp_cropped_pptx_image_sample_image_09.jpeg_B2.png"/>
+          <p:cNvPr id="3" name="Picture 2" descr="tmp1mrer_dg.png"/>
           <p:cNvPicPr>
             <a:picLocks noChangeAspect="1"/>
           </p:cNvPicPr>
@@ -4459,7 +4497,7 @@
       </p:pic>
       <p:pic>
         <p:nvPicPr>
-          <p:cNvPr id="4" name="Picture 3" descr="temp_cropped_pptx_image_sample_image_09.jpeg_B8.png"/>
+          <p:cNvPr id="4" name="Picture 3" descr="tmpgupedown.png"/>
           <p:cNvPicPr>
             <a:picLocks noChangeAspect="1"/>
           </p:cNvPicPr>
@@ -4483,7 +4521,7 @@
       </p:pic>
       <p:pic>
         <p:nvPicPr>
-          <p:cNvPr id="5" name="Picture 4" descr="temp_cropped_pptx_image_sample_image_09.jpeg_B14.png"/>
+          <p:cNvPr id="5" name="Picture 4" descr="tmpczl607xc.png"/>
           <p:cNvPicPr>
             <a:picLocks noChangeAspect="1"/>
           </p:cNvPicPr>
@@ -4507,7 +4545,7 @@
       </p:pic>
       <p:pic>
         <p:nvPicPr>
-          <p:cNvPr id="6" name="Picture 5" descr="temp_cropped_pptx_image_sample_image_09.jpeg_B20.png"/>
+          <p:cNvPr id="6" name="Picture 5" descr="tmpomb7nlgz.png"/>
           <p:cNvPicPr>
             <a:picLocks noChangeAspect="1"/>
           </p:cNvPicPr>

</xml_diff>